<commit_message>
Finished Project Proposal Presentation
</commit_message>
<xml_diff>
--- a/Project_Proposal_Presentation.pptx
+++ b/Project_Proposal_Presentation.pptx
@@ -5,7 +5,7 @@
     <p:sldMasterId id="2147483648" r:id="rId1"/>
   </p:sldMasterIdLst>
   <p:notesMasterIdLst>
-    <p:notesMasterId r:id="rId10"/>
+    <p:notesMasterId r:id="rId13"/>
   </p:notesMasterIdLst>
   <p:sldIdLst>
     <p:sldId id="489" r:id="rId2"/>
@@ -15,7 +15,10 @@
     <p:sldId id="439" r:id="rId6"/>
     <p:sldId id="491" r:id="rId7"/>
     <p:sldId id="492" r:id="rId8"/>
-    <p:sldId id="490" r:id="rId9"/>
+    <p:sldId id="493" r:id="rId9"/>
+    <p:sldId id="494" r:id="rId10"/>
+    <p:sldId id="495" r:id="rId11"/>
+    <p:sldId id="490" r:id="rId12"/>
   </p:sldIdLst>
   <p:sldSz cx="12192000" cy="6858000"/>
   <p:notesSz cx="6858000" cy="9144000"/>
@@ -204,7 +207,7 @@
           <a:p>
             <a:fld id="{C6768FEE-7630-644D-BB78-46EB6D63E191}" type="datetimeFigureOut">
               <a:rPr lang="en-US" smtClean="0"/>
-              <a:t>9/27/2023</a:t>
+              <a:t>9/28/2023</a:t>
             </a:fld>
             <a:endParaRPr lang="en-US"/>
           </a:p>
@@ -1063,7 +1066,7 @@
           <a:p>
             <a:fld id="{B6DC5F7C-D12E-B848-AEA4-311FAAAE245D}" type="datetimeFigureOut">
               <a:rPr lang="en-US" smtClean="0"/>
-              <a:t>9/27/2023</a:t>
+              <a:t>9/28/2023</a:t>
             </a:fld>
             <a:endParaRPr lang="en-US"/>
           </a:p>
@@ -1360,7 +1363,7 @@
           <a:p>
             <a:fld id="{B6DC5F7C-D12E-B848-AEA4-311FAAAE245D}" type="datetimeFigureOut">
               <a:rPr lang="en-US" smtClean="0"/>
-              <a:t>9/27/2023</a:t>
+              <a:t>9/28/2023</a:t>
             </a:fld>
             <a:endParaRPr lang="en-US"/>
           </a:p>
@@ -1606,7 +1609,7 @@
           <a:p>
             <a:fld id="{B6DC5F7C-D12E-B848-AEA4-311FAAAE245D}" type="datetimeFigureOut">
               <a:rPr lang="en-US" smtClean="0"/>
-              <a:t>9/27/2023</a:t>
+              <a:t>9/28/2023</a:t>
             </a:fld>
             <a:endParaRPr lang="en-US"/>
           </a:p>
@@ -1859,7 +1862,7 @@
           <a:p>
             <a:fld id="{B6DC5F7C-D12E-B848-AEA4-311FAAAE245D}" type="datetimeFigureOut">
               <a:rPr lang="en-US" smtClean="0"/>
-              <a:t>9/27/2023</a:t>
+              <a:t>9/28/2023</a:t>
             </a:fld>
             <a:endParaRPr lang="en-US"/>
           </a:p>
@@ -2154,7 +2157,7 @@
           <a:p>
             <a:fld id="{B6DC5F7C-D12E-B848-AEA4-311FAAAE245D}" type="datetimeFigureOut">
               <a:rPr lang="en-US" smtClean="0"/>
-              <a:t>9/27/2023</a:t>
+              <a:t>9/28/2023</a:t>
             </a:fld>
             <a:endParaRPr lang="en-US"/>
           </a:p>
@@ -3562,7 +3565,7 @@
           <a:p>
             <a:fld id="{B6DC5F7C-D12E-B848-AEA4-311FAAAE245D}" type="datetimeFigureOut">
               <a:rPr lang="en-US" smtClean="0"/>
-              <a:t>9/27/2023</a:t>
+              <a:t>9/28/2023</a:t>
             </a:fld>
             <a:endParaRPr lang="en-US"/>
           </a:p>
@@ -4059,7 +4062,7 @@
           <a:p>
             <a:fld id="{B6DC5F7C-D12E-B848-AEA4-311FAAAE245D}" type="datetimeFigureOut">
               <a:rPr lang="en-US" smtClean="0"/>
-              <a:t>9/27/2023</a:t>
+              <a:t>9/28/2023</a:t>
             </a:fld>
             <a:endParaRPr lang="en-US"/>
           </a:p>
@@ -4172,7 +4175,7 @@
           <a:p>
             <a:fld id="{B6DC5F7C-D12E-B848-AEA4-311FAAAE245D}" type="datetimeFigureOut">
               <a:rPr lang="en-US" smtClean="0"/>
-              <a:t>9/27/2023</a:t>
+              <a:t>9/28/2023</a:t>
             </a:fld>
             <a:endParaRPr lang="en-US"/>
           </a:p>
@@ -4413,7 +4416,7 @@
           <a:p>
             <a:fld id="{B6DC5F7C-D12E-B848-AEA4-311FAAAE245D}" type="datetimeFigureOut">
               <a:rPr lang="en-US" smtClean="0"/>
-              <a:t>9/27/2023</a:t>
+              <a:t>9/28/2023</a:t>
             </a:fld>
             <a:endParaRPr lang="en-US"/>
           </a:p>
@@ -5021,6 +5024,289 @@
 </p:sld>
 </file>
 
+<file path=ppt/slides/slide10.xml><?xml version="1.0" encoding="utf-8"?>
+<p:sld xmlns:a="http://schemas.openxmlformats.org/drawingml/2006/main" xmlns:r="http://schemas.openxmlformats.org/officeDocument/2006/relationships" xmlns:p="http://schemas.openxmlformats.org/presentationml/2006/main">
+  <p:cSld>
+    <p:spTree>
+      <p:nvGrpSpPr>
+        <p:cNvPr id="1" name=""/>
+        <p:cNvGrpSpPr/>
+        <p:nvPr/>
+      </p:nvGrpSpPr>
+      <p:grpSpPr>
+        <a:xfrm>
+          <a:off x="0" y="0"/>
+          <a:ext cx="0" cy="0"/>
+          <a:chOff x="0" y="0"/>
+          <a:chExt cx="0" cy="0"/>
+        </a:xfrm>
+      </p:grpSpPr>
+      <p:sp>
+        <p:nvSpPr>
+          <p:cNvPr id="2" name="Title 1">
+            <a:extLst>
+              <a:ext uri="{FF2B5EF4-FFF2-40B4-BE49-F238E27FC236}">
+                <a16:creationId xmlns:a16="http://schemas.microsoft.com/office/drawing/2014/main" id="{D48D19CC-5C21-B973-4B4C-E98C9E21CAE1}"/>
+              </a:ext>
+            </a:extLst>
+          </p:cNvPr>
+          <p:cNvSpPr>
+            <a:spLocks noGrp="1"/>
+          </p:cNvSpPr>
+          <p:nvPr>
+            <p:ph type="title"/>
+          </p:nvPr>
+        </p:nvSpPr>
+        <p:spPr/>
+        <p:txBody>
+          <a:bodyPr>
+            <a:normAutofit/>
+          </a:bodyPr>
+          <a:lstStyle/>
+          <a:p>
+            <a:r>
+              <a:rPr lang="en-US" dirty="0"/>
+              <a:t>Localization and Mapping</a:t>
+            </a:r>
+          </a:p>
+        </p:txBody>
+      </p:sp>
+      <p:sp>
+        <p:nvSpPr>
+          <p:cNvPr id="3" name="Content Placeholder 2">
+            <a:extLst>
+              <a:ext uri="{FF2B5EF4-FFF2-40B4-BE49-F238E27FC236}">
+                <a16:creationId xmlns:a16="http://schemas.microsoft.com/office/drawing/2014/main" id="{13BC9E39-8AFE-B87C-7D9A-2563780E4CFD}"/>
+              </a:ext>
+            </a:extLst>
+          </p:cNvPr>
+          <p:cNvSpPr>
+            <a:spLocks noGrp="1"/>
+          </p:cNvSpPr>
+          <p:nvPr>
+            <p:ph idx="1"/>
+          </p:nvPr>
+        </p:nvSpPr>
+        <p:spPr/>
+        <p:txBody>
+          <a:bodyPr/>
+          <a:lstStyle/>
+          <a:p>
+            <a:r>
+              <a:rPr lang="en-US" dirty="0"/>
+              <a:t>Enhancement of Localization Techniques</a:t>
+            </a:r>
+          </a:p>
+          <a:p>
+            <a:r>
+              <a:rPr lang="en-US" dirty="0"/>
+              <a:t>Deployment of Simultaneous Localization and Mapping(SLAM)</a:t>
+            </a:r>
+          </a:p>
+          <a:p>
+            <a:r>
+              <a:rPr lang="en-US" dirty="0"/>
+              <a:t>Use of Extended Kalman Filter Localization </a:t>
+            </a:r>
+          </a:p>
+          <a:p>
+            <a:r>
+              <a:rPr lang="en-US" dirty="0"/>
+              <a:t>Utilization of Monte Carlo Localization(MCL)</a:t>
+            </a:r>
+          </a:p>
+        </p:txBody>
+      </p:sp>
+    </p:spTree>
+    <p:extLst>
+      <p:ext uri="{BB962C8B-B14F-4D97-AF65-F5344CB8AC3E}">
+        <p14:creationId xmlns:p14="http://schemas.microsoft.com/office/powerpoint/2010/main" val="3446860254"/>
+      </p:ext>
+    </p:extLst>
+  </p:cSld>
+  <p:clrMapOvr>
+    <a:masterClrMapping/>
+  </p:clrMapOvr>
+</p:sld>
+</file>
+
+<file path=ppt/slides/slide11.xml><?xml version="1.0" encoding="utf-8"?>
+<p:sld xmlns:a="http://schemas.openxmlformats.org/drawingml/2006/main" xmlns:r="http://schemas.openxmlformats.org/officeDocument/2006/relationships" xmlns:p="http://schemas.openxmlformats.org/presentationml/2006/main">
+  <p:cSld>
+    <p:spTree>
+      <p:nvGrpSpPr>
+        <p:cNvPr id="1" name=""/>
+        <p:cNvGrpSpPr/>
+        <p:nvPr/>
+      </p:nvGrpSpPr>
+      <p:grpSpPr>
+        <a:xfrm>
+          <a:off x="0" y="0"/>
+          <a:ext cx="0" cy="0"/>
+          <a:chOff x="0" y="0"/>
+          <a:chExt cx="0" cy="0"/>
+        </a:xfrm>
+      </p:grpSpPr>
+      <p:sp>
+        <p:nvSpPr>
+          <p:cNvPr id="4" name="Rectangle 3">
+            <a:extLst>
+              <a:ext uri="{FF2B5EF4-FFF2-40B4-BE49-F238E27FC236}">
+                <a16:creationId xmlns:a16="http://schemas.microsoft.com/office/drawing/2014/main" id="{E2FB3CA2-CB45-3045-A78F-FAA3449A25B6}"/>
+              </a:ext>
+              <a:ext uri="{C183D7F6-B498-43B3-948B-1728B52AA6E4}">
+                <adec:decorative xmlns:adec="http://schemas.microsoft.com/office/drawing/2017/decorative" val="1"/>
+              </a:ext>
+            </a:extLst>
+          </p:cNvPr>
+          <p:cNvSpPr/>
+          <p:nvPr/>
+        </p:nvSpPr>
+        <p:spPr>
+          <a:xfrm>
+            <a:off x="6913058" y="2979506"/>
+            <a:ext cx="4023360" cy="914400"/>
+          </a:xfrm>
+          <a:prstGeom prst="rect">
+            <a:avLst/>
+          </a:prstGeom>
+          <a:solidFill>
+            <a:schemeClr val="bg1"/>
+          </a:solidFill>
+          <a:ln>
+            <a:noFill/>
+          </a:ln>
+        </p:spPr>
+        <p:style>
+          <a:lnRef idx="2">
+            <a:schemeClr val="accent1">
+              <a:shade val="50000"/>
+            </a:schemeClr>
+          </a:lnRef>
+          <a:fillRef idx="1">
+            <a:schemeClr val="accent1"/>
+          </a:fillRef>
+          <a:effectRef idx="0">
+            <a:schemeClr val="accent1"/>
+          </a:effectRef>
+          <a:fontRef idx="minor">
+            <a:schemeClr val="lt1"/>
+          </a:fontRef>
+        </p:style>
+        <p:txBody>
+          <a:bodyPr rtlCol="0" anchor="ctr"/>
+          <a:lstStyle/>
+          <a:p>
+            <a:pPr algn="ctr"/>
+            <a:endParaRPr lang="en-US"/>
+          </a:p>
+        </p:txBody>
+      </p:sp>
+      <p:sp>
+        <p:nvSpPr>
+          <p:cNvPr id="5" name="Rectangle 4">
+            <a:extLst>
+              <a:ext uri="{FF2B5EF4-FFF2-40B4-BE49-F238E27FC236}">
+                <a16:creationId xmlns:a16="http://schemas.microsoft.com/office/drawing/2014/main" id="{0DF4A6B2-64E9-3B49-9365-B104DC40AB63}"/>
+              </a:ext>
+              <a:ext uri="{C183D7F6-B498-43B3-948B-1728B52AA6E4}">
+                <adec:decorative xmlns:adec="http://schemas.microsoft.com/office/drawing/2017/decorative" val="1"/>
+              </a:ext>
+            </a:extLst>
+          </p:cNvPr>
+          <p:cNvSpPr/>
+          <p:nvPr/>
+        </p:nvSpPr>
+        <p:spPr>
+          <a:xfrm>
+            <a:off x="6913058" y="2064924"/>
+            <a:ext cx="4480560" cy="914400"/>
+          </a:xfrm>
+          <a:prstGeom prst="rect">
+            <a:avLst/>
+          </a:prstGeom>
+          <a:solidFill>
+            <a:schemeClr val="bg1"/>
+          </a:solidFill>
+          <a:ln>
+            <a:noFill/>
+          </a:ln>
+        </p:spPr>
+        <p:style>
+          <a:lnRef idx="2">
+            <a:schemeClr val="accent1">
+              <a:shade val="50000"/>
+            </a:schemeClr>
+          </a:lnRef>
+          <a:fillRef idx="1">
+            <a:schemeClr val="accent1"/>
+          </a:fillRef>
+          <a:effectRef idx="0">
+            <a:schemeClr val="accent1"/>
+          </a:effectRef>
+          <a:fontRef idx="minor">
+            <a:schemeClr val="lt1"/>
+          </a:fontRef>
+        </p:style>
+        <p:txBody>
+          <a:bodyPr rtlCol="0" anchor="ctr"/>
+          <a:lstStyle/>
+          <a:p>
+            <a:pPr algn="ctr"/>
+            <a:endParaRPr lang="en-US"/>
+          </a:p>
+        </p:txBody>
+      </p:sp>
+      <p:sp>
+        <p:nvSpPr>
+          <p:cNvPr id="2" name="Title 1">
+            <a:extLst>
+              <a:ext uri="{FF2B5EF4-FFF2-40B4-BE49-F238E27FC236}">
+                <a16:creationId xmlns:a16="http://schemas.microsoft.com/office/drawing/2014/main" id="{34E0C55B-C810-F44D-B5D9-B6F5E13C3AF7}"/>
+              </a:ext>
+            </a:extLst>
+          </p:cNvPr>
+          <p:cNvSpPr>
+            <a:spLocks noGrp="1"/>
+          </p:cNvSpPr>
+          <p:nvPr>
+            <p:ph type="ctrTitle"/>
+          </p:nvPr>
+        </p:nvSpPr>
+        <p:spPr>
+          <a:xfrm>
+            <a:off x="6990094" y="2008309"/>
+            <a:ext cx="4480560" cy="1894347"/>
+          </a:xfrm>
+        </p:spPr>
+        <p:txBody>
+          <a:bodyPr/>
+          <a:lstStyle/>
+          <a:p>
+            <a:r>
+              <a:rPr lang="en-US" dirty="0"/>
+              <a:t>Thank you </a:t>
+            </a:r>
+            <a:br>
+              <a:rPr lang="en-US" dirty="0"/>
+            </a:br>
+            <a:endParaRPr lang="en-US" dirty="0"/>
+          </a:p>
+        </p:txBody>
+      </p:sp>
+    </p:spTree>
+    <p:extLst>
+      <p:ext uri="{BB962C8B-B14F-4D97-AF65-F5344CB8AC3E}">
+        <p14:creationId xmlns:p14="http://schemas.microsoft.com/office/powerpoint/2010/main" val="2279108006"/>
+      </p:ext>
+    </p:extLst>
+  </p:cSld>
+  <p:clrMapOvr>
+    <a:masterClrMapping/>
+  </p:clrMapOvr>
+</p:sld>
+</file>
+
 <file path=ppt/slides/slide2.xml><?xml version="1.0" encoding="utf-8"?>
 <p:sld xmlns:a="http://schemas.openxmlformats.org/drawingml/2006/main" xmlns:r="http://schemas.openxmlformats.org/officeDocument/2006/relationships" xmlns:p="http://schemas.openxmlformats.org/presentationml/2006/main">
   <p:cSld>
@@ -6144,155 +6430,182 @@
       </p:grpSpPr>
       <p:sp>
         <p:nvSpPr>
-          <p:cNvPr id="4" name="Rectangle 3">
-            <a:extLst>
-              <a:ext uri="{FF2B5EF4-FFF2-40B4-BE49-F238E27FC236}">
-                <a16:creationId xmlns:a16="http://schemas.microsoft.com/office/drawing/2014/main" id="{E2FB3CA2-CB45-3045-A78F-FAA3449A25B6}"/>
-              </a:ext>
-              <a:ext uri="{C183D7F6-B498-43B3-948B-1728B52AA6E4}">
-                <adec:decorative xmlns:adec="http://schemas.microsoft.com/office/drawing/2017/decorative" val="1"/>
-              </a:ext>
-            </a:extLst>
-          </p:cNvPr>
-          <p:cNvSpPr/>
-          <p:nvPr/>
-        </p:nvSpPr>
-        <p:spPr>
-          <a:xfrm>
-            <a:off x="6913058" y="2979506"/>
-            <a:ext cx="4023360" cy="914400"/>
-          </a:xfrm>
-          <a:prstGeom prst="rect">
-            <a:avLst/>
-          </a:prstGeom>
-          <a:solidFill>
-            <a:schemeClr val="bg1"/>
-          </a:solidFill>
-          <a:ln>
-            <a:noFill/>
-          </a:ln>
-        </p:spPr>
-        <p:style>
-          <a:lnRef idx="2">
-            <a:schemeClr val="accent1">
-              <a:shade val="50000"/>
-            </a:schemeClr>
-          </a:lnRef>
-          <a:fillRef idx="1">
-            <a:schemeClr val="accent1"/>
-          </a:fillRef>
-          <a:effectRef idx="0">
-            <a:schemeClr val="accent1"/>
-          </a:effectRef>
-          <a:fontRef idx="minor">
-            <a:schemeClr val="lt1"/>
-          </a:fontRef>
-        </p:style>
-        <p:txBody>
-          <a:bodyPr rtlCol="0" anchor="ctr"/>
-          <a:lstStyle/>
-          <a:p>
-            <a:pPr algn="ctr"/>
-            <a:endParaRPr lang="en-US"/>
-          </a:p>
-        </p:txBody>
-      </p:sp>
-      <p:sp>
-        <p:nvSpPr>
-          <p:cNvPr id="5" name="Rectangle 4">
-            <a:extLst>
-              <a:ext uri="{FF2B5EF4-FFF2-40B4-BE49-F238E27FC236}">
-                <a16:creationId xmlns:a16="http://schemas.microsoft.com/office/drawing/2014/main" id="{0DF4A6B2-64E9-3B49-9365-B104DC40AB63}"/>
-              </a:ext>
-              <a:ext uri="{C183D7F6-B498-43B3-948B-1728B52AA6E4}">
-                <adec:decorative xmlns:adec="http://schemas.microsoft.com/office/drawing/2017/decorative" val="1"/>
-              </a:ext>
-            </a:extLst>
-          </p:cNvPr>
-          <p:cNvSpPr/>
-          <p:nvPr/>
-        </p:nvSpPr>
-        <p:spPr>
-          <a:xfrm>
-            <a:off x="6913058" y="2064924"/>
-            <a:ext cx="4480560" cy="914400"/>
-          </a:xfrm>
-          <a:prstGeom prst="rect">
-            <a:avLst/>
-          </a:prstGeom>
-          <a:solidFill>
-            <a:schemeClr val="bg1"/>
-          </a:solidFill>
-          <a:ln>
-            <a:noFill/>
-          </a:ln>
-        </p:spPr>
-        <p:style>
-          <a:lnRef idx="2">
-            <a:schemeClr val="accent1">
-              <a:shade val="50000"/>
-            </a:schemeClr>
-          </a:lnRef>
-          <a:fillRef idx="1">
-            <a:schemeClr val="accent1"/>
-          </a:fillRef>
-          <a:effectRef idx="0">
-            <a:schemeClr val="accent1"/>
-          </a:effectRef>
-          <a:fontRef idx="minor">
-            <a:schemeClr val="lt1"/>
-          </a:fontRef>
-        </p:style>
-        <p:txBody>
-          <a:bodyPr rtlCol="0" anchor="ctr"/>
-          <a:lstStyle/>
-          <a:p>
-            <a:pPr algn="ctr"/>
-            <a:endParaRPr lang="en-US"/>
-          </a:p>
-        </p:txBody>
-      </p:sp>
-      <p:sp>
-        <p:nvSpPr>
           <p:cNvPr id="2" name="Title 1">
             <a:extLst>
               <a:ext uri="{FF2B5EF4-FFF2-40B4-BE49-F238E27FC236}">
-                <a16:creationId xmlns:a16="http://schemas.microsoft.com/office/drawing/2014/main" id="{34E0C55B-C810-F44D-B5D9-B6F5E13C3AF7}"/>
-              </a:ext>
-            </a:extLst>
-          </p:cNvPr>
-          <p:cNvSpPr>
-            <a:spLocks noGrp="1"/>
-          </p:cNvSpPr>
-          <p:nvPr>
-            <p:ph type="ctrTitle"/>
-          </p:nvPr>
-        </p:nvSpPr>
-        <p:spPr>
-          <a:xfrm>
-            <a:off x="6990094" y="2008309"/>
-            <a:ext cx="4480560" cy="1894347"/>
-          </a:xfrm>
-        </p:spPr>
+                <a16:creationId xmlns:a16="http://schemas.microsoft.com/office/drawing/2014/main" id="{41930259-BD6D-F809-5C49-C6F7F72D4466}"/>
+              </a:ext>
+            </a:extLst>
+          </p:cNvPr>
+          <p:cNvSpPr>
+            <a:spLocks noGrp="1"/>
+          </p:cNvSpPr>
+          <p:nvPr>
+            <p:ph type="title"/>
+          </p:nvPr>
+        </p:nvSpPr>
+        <p:spPr/>
         <p:txBody>
           <a:bodyPr/>
           <a:lstStyle/>
           <a:p>
             <a:r>
               <a:rPr lang="en-US" dirty="0"/>
-              <a:t>Thank you </a:t>
-            </a:r>
-            <a:br>
-              <a:rPr lang="en-US" dirty="0"/>
-            </a:br>
-            <a:endParaRPr lang="en-US" dirty="0"/>
+              <a:t>Control Optimization</a:t>
+            </a:r>
+          </a:p>
+        </p:txBody>
+      </p:sp>
+      <p:sp>
+        <p:nvSpPr>
+          <p:cNvPr id="3" name="Content Placeholder 2">
+            <a:extLst>
+              <a:ext uri="{FF2B5EF4-FFF2-40B4-BE49-F238E27FC236}">
+                <a16:creationId xmlns:a16="http://schemas.microsoft.com/office/drawing/2014/main" id="{DF0340D9-44DF-A558-185D-A1E8E0298613}"/>
+              </a:ext>
+            </a:extLst>
+          </p:cNvPr>
+          <p:cNvSpPr>
+            <a:spLocks noGrp="1"/>
+          </p:cNvSpPr>
+          <p:nvPr>
+            <p:ph idx="1"/>
+          </p:nvPr>
+        </p:nvSpPr>
+        <p:spPr/>
+        <p:txBody>
+          <a:bodyPr/>
+          <a:lstStyle/>
+          <a:p>
+            <a:r>
+              <a:rPr lang="en-US" dirty="0"/>
+              <a:t>Optimization of algorithms for better hardware control</a:t>
+            </a:r>
+          </a:p>
+          <a:p>
+            <a:r>
+              <a:rPr lang="en-US" dirty="0"/>
+              <a:t>Introduce high intensity parameters like high-speed turns and traction-based acceleration. </a:t>
+            </a:r>
+          </a:p>
+          <a:p>
+            <a:r>
+              <a:rPr lang="en-US" dirty="0"/>
+              <a:t>Identifying control constraints</a:t>
+            </a:r>
+          </a:p>
+          <a:p>
+            <a:r>
+              <a:rPr lang="en-US" dirty="0"/>
+              <a:t>Reduce distortion between optimized trajectory vs. actual trajectory</a:t>
+            </a:r>
           </a:p>
         </p:txBody>
       </p:sp>
     </p:spTree>
     <p:extLst>
       <p:ext uri="{BB962C8B-B14F-4D97-AF65-F5344CB8AC3E}">
-        <p14:creationId xmlns:p14="http://schemas.microsoft.com/office/powerpoint/2010/main" val="2279108006"/>
+        <p14:creationId xmlns:p14="http://schemas.microsoft.com/office/powerpoint/2010/main" val="512991990"/>
+      </p:ext>
+    </p:extLst>
+  </p:cSld>
+  <p:clrMapOvr>
+    <a:masterClrMapping/>
+  </p:clrMapOvr>
+</p:sld>
+</file>
+
+<file path=ppt/slides/slide9.xml><?xml version="1.0" encoding="utf-8"?>
+<p:sld xmlns:a="http://schemas.openxmlformats.org/drawingml/2006/main" xmlns:r="http://schemas.openxmlformats.org/officeDocument/2006/relationships" xmlns:p="http://schemas.openxmlformats.org/presentationml/2006/main">
+  <p:cSld>
+    <p:spTree>
+      <p:nvGrpSpPr>
+        <p:cNvPr id="1" name=""/>
+        <p:cNvGrpSpPr/>
+        <p:nvPr/>
+      </p:nvGrpSpPr>
+      <p:grpSpPr>
+        <a:xfrm>
+          <a:off x="0" y="0"/>
+          <a:ext cx="0" cy="0"/>
+          <a:chOff x="0" y="0"/>
+          <a:chExt cx="0" cy="0"/>
+        </a:xfrm>
+      </p:grpSpPr>
+      <p:sp>
+        <p:nvSpPr>
+          <p:cNvPr id="2" name="Title 1">
+            <a:extLst>
+              <a:ext uri="{FF2B5EF4-FFF2-40B4-BE49-F238E27FC236}">
+                <a16:creationId xmlns:a16="http://schemas.microsoft.com/office/drawing/2014/main" id="{EF6A06D4-0A47-5856-1615-1695839D5529}"/>
+              </a:ext>
+            </a:extLst>
+          </p:cNvPr>
+          <p:cNvSpPr>
+            <a:spLocks noGrp="1"/>
+          </p:cNvSpPr>
+          <p:nvPr>
+            <p:ph type="title"/>
+          </p:nvPr>
+        </p:nvSpPr>
+        <p:spPr/>
+        <p:txBody>
+          <a:bodyPr>
+            <a:normAutofit/>
+          </a:bodyPr>
+          <a:lstStyle/>
+          <a:p>
+            <a:r>
+              <a:rPr lang="en-US" dirty="0"/>
+              <a:t> ML and Deep Learning</a:t>
+            </a:r>
+          </a:p>
+        </p:txBody>
+      </p:sp>
+      <p:sp>
+        <p:nvSpPr>
+          <p:cNvPr id="3" name="Content Placeholder 2">
+            <a:extLst>
+              <a:ext uri="{FF2B5EF4-FFF2-40B4-BE49-F238E27FC236}">
+                <a16:creationId xmlns:a16="http://schemas.microsoft.com/office/drawing/2014/main" id="{E1A21F41-3B36-CA17-5745-E9A8DF8A542D}"/>
+              </a:ext>
+            </a:extLst>
+          </p:cNvPr>
+          <p:cNvSpPr>
+            <a:spLocks noGrp="1"/>
+          </p:cNvSpPr>
+          <p:nvPr>
+            <p:ph idx="1"/>
+          </p:nvPr>
+        </p:nvSpPr>
+        <p:spPr/>
+        <p:txBody>
+          <a:bodyPr/>
+          <a:lstStyle/>
+          <a:p>
+            <a:r>
+              <a:rPr lang="en-US" dirty="0"/>
+              <a:t>Introduction of machine learning and deep learning techniques in the stable control environment.</a:t>
+            </a:r>
+          </a:p>
+          <a:p>
+            <a:r>
+              <a:rPr lang="en-US" dirty="0"/>
+              <a:t>Perception, control and decision-making algorithms based on ML and Deep Learning</a:t>
+            </a:r>
+          </a:p>
+          <a:p>
+            <a:r>
+              <a:rPr lang="en-US" dirty="0"/>
+              <a:t>Model training for object detection, trajectory prediction and race strategy. </a:t>
+            </a:r>
+          </a:p>
+        </p:txBody>
+      </p:sp>
+    </p:spTree>
+    <p:extLst>
+      <p:ext uri="{BB962C8B-B14F-4D97-AF65-F5344CB8AC3E}">
+        <p14:creationId xmlns:p14="http://schemas.microsoft.com/office/powerpoint/2010/main" val="3164187975"/>
       </p:ext>
     </p:extLst>
   </p:cSld>

</xml_diff>